<commit_message>
Adjust the 2pc figure
</commit_message>
<xml_diff>
--- a/coordination/images/source.pptx
+++ b/coordination/images/source.pptx
@@ -5352,20 +5352,20 @@
       </p:grpSp>
       <p:cxnSp>
         <p:nvCxnSpPr>
-          <p:cNvPr id="47" name="Straight Connector 46"/>
+          <p:cNvPr id="49" name="Straight Connector 48"/>
           <p:cNvCxnSpPr/>
           <p:nvPr/>
         </p:nvCxnSpPr>
         <p:spPr>
           <a:xfrm>
-            <a:off x="1691680" y="1526269"/>
-            <a:ext cx="0" cy="1224136"/>
+            <a:off x="3059832" y="1366817"/>
+            <a:ext cx="0" cy="1383588"/>
           </a:xfrm>
           <a:prstGeom prst="line">
             <a:avLst/>
           </a:prstGeom>
-          <a:ln>
-            <a:prstDash val="dash"/>
+          <a:ln w="9525">
+            <a:prstDash val="lgDashDotDot"/>
           </a:ln>
         </p:spPr>
         <p:style>
@@ -5383,81 +5383,15 @@
           </a:fontRef>
         </p:style>
       </p:cxnSp>
-      <p:cxnSp>
-        <p:nvCxnSpPr>
-          <p:cNvPr id="49" name="Straight Connector 48"/>
-          <p:cNvCxnSpPr/>
-          <p:nvPr/>
-        </p:nvCxnSpPr>
-        <p:spPr>
-          <a:xfrm>
-            <a:off x="3059832" y="1526269"/>
-            <a:ext cx="0" cy="1224136"/>
-          </a:xfrm>
-          <a:prstGeom prst="line">
-            <a:avLst/>
-          </a:prstGeom>
-          <a:ln>
-            <a:prstDash val="dash"/>
-          </a:ln>
-        </p:spPr>
-        <p:style>
-          <a:lnRef idx="1">
-            <a:schemeClr val="accent1"/>
-          </a:lnRef>
-          <a:fillRef idx="0">
-            <a:schemeClr val="accent1"/>
-          </a:fillRef>
-          <a:effectRef idx="0">
-            <a:schemeClr val="accent1"/>
-          </a:effectRef>
-          <a:fontRef idx="minor">
-            <a:schemeClr val="tx1"/>
-          </a:fontRef>
-        </p:style>
-      </p:cxnSp>
-      <p:cxnSp>
-        <p:nvCxnSpPr>
-          <p:cNvPr id="50" name="Straight Connector 49"/>
-          <p:cNvCxnSpPr/>
-          <p:nvPr/>
-        </p:nvCxnSpPr>
-        <p:spPr>
-          <a:xfrm>
-            <a:off x="4067944" y="1526269"/>
-            <a:ext cx="0" cy="1224136"/>
-          </a:xfrm>
-          <a:prstGeom prst="line">
-            <a:avLst/>
-          </a:prstGeom>
-          <a:ln>
-            <a:prstDash val="dash"/>
-          </a:ln>
-        </p:spPr>
-        <p:style>
-          <a:lnRef idx="1">
-            <a:schemeClr val="accent1"/>
-          </a:lnRef>
-          <a:fillRef idx="0">
-            <a:schemeClr val="accent1"/>
-          </a:fillRef>
-          <a:effectRef idx="0">
-            <a:schemeClr val="accent1"/>
-          </a:effectRef>
-          <a:fontRef idx="minor">
-            <a:schemeClr val="tx1"/>
-          </a:fontRef>
-        </p:style>
-      </p:cxnSp>
-      <p:sp>
-        <p:nvSpPr>
-          <p:cNvPr id="56" name="TextBox 55"/>
+      <p:sp>
+        <p:nvSpPr>
+          <p:cNvPr id="29" name="TextBox 28"/>
           <p:cNvSpPr txBox="1"/>
           <p:nvPr/>
         </p:nvSpPr>
         <p:spPr>
           <a:xfrm>
-            <a:off x="1172580" y="1366817"/>
+            <a:off x="1691680" y="1366817"/>
             <a:ext cx="301686" cy="369332"/>
           </a:xfrm>
           <a:prstGeom prst="rect">
@@ -5481,13 +5415,13 @@
       </p:sp>
       <p:sp>
         <p:nvSpPr>
-          <p:cNvPr id="57" name="TextBox 56"/>
+          <p:cNvPr id="31" name="TextBox 30"/>
           <p:cNvSpPr txBox="1"/>
           <p:nvPr/>
         </p:nvSpPr>
         <p:spPr>
           <a:xfrm>
-            <a:off x="2240124" y="1366817"/>
+            <a:off x="3498106" y="1366817"/>
             <a:ext cx="301686" cy="369332"/>
           </a:xfrm>
           <a:prstGeom prst="rect">
@@ -5504,36 +5438,6 @@
             <a:r>
               <a:rPr lang="en-US" dirty="0" smtClean="0"/>
               <a:t>2</a:t>
-            </a:r>
-            <a:endParaRPr lang="en-US" dirty="0"/>
-          </a:p>
-        </p:txBody>
-      </p:sp>
-      <p:sp>
-        <p:nvSpPr>
-          <p:cNvPr id="58" name="TextBox 57"/>
-          <p:cNvSpPr txBox="1"/>
-          <p:nvPr/>
-        </p:nvSpPr>
-        <p:spPr>
-          <a:xfrm>
-            <a:off x="3439530" y="1366817"/>
-            <a:ext cx="301686" cy="369332"/>
-          </a:xfrm>
-          <a:prstGeom prst="rect">
-            <a:avLst/>
-          </a:prstGeom>
-          <a:noFill/>
-        </p:spPr>
-        <p:txBody>
-          <a:bodyPr wrap="none" rtlCol="0">
-            <a:spAutoFit/>
-          </a:bodyPr>
-          <a:lstStyle/>
-          <a:p>
-            <a:r>
-              <a:rPr lang="en-US" dirty="0" smtClean="0"/>
-              <a:t>3</a:t>
             </a:r>
             <a:endParaRPr lang="en-US" dirty="0"/>
           </a:p>

</xml_diff>